<commit_message>
fill presentation with info
</commit_message>
<xml_diff>
--- a/presentations/angular2.pptx
+++ b/presentations/angular2.pptx
@@ -5,7 +5,7 @@
     <p:sldMasterId id="2147483660" r:id="rId1"/>
   </p:sldMasterIdLst>
   <p:notesMasterIdLst>
-    <p:notesMasterId r:id="rId33"/>
+    <p:notesMasterId r:id="rId35"/>
   </p:notesMasterIdLst>
   <p:sldIdLst>
     <p:sldId id="256" r:id="rId2"/>
@@ -31,14 +31,16 @@
     <p:sldId id="287" r:id="rId22"/>
     <p:sldId id="285" r:id="rId23"/>
     <p:sldId id="274" r:id="rId24"/>
-    <p:sldId id="275" r:id="rId25"/>
-    <p:sldId id="276" r:id="rId26"/>
-    <p:sldId id="278" r:id="rId27"/>
-    <p:sldId id="279" r:id="rId28"/>
-    <p:sldId id="280" r:id="rId29"/>
-    <p:sldId id="281" r:id="rId30"/>
-    <p:sldId id="282" r:id="rId31"/>
-    <p:sldId id="286" r:id="rId32"/>
+    <p:sldId id="290" r:id="rId25"/>
+    <p:sldId id="275" r:id="rId26"/>
+    <p:sldId id="276" r:id="rId27"/>
+    <p:sldId id="278" r:id="rId28"/>
+    <p:sldId id="279" r:id="rId29"/>
+    <p:sldId id="280" r:id="rId30"/>
+    <p:sldId id="281" r:id="rId31"/>
+    <p:sldId id="291" r:id="rId32"/>
+    <p:sldId id="282" r:id="rId33"/>
+    <p:sldId id="286" r:id="rId34"/>
   </p:sldIdLst>
   <p:sldSz cx="12192000" cy="6858000"/>
   <p:notesSz cx="6858000" cy="9144000"/>
@@ -1117,6 +1119,13 @@
         </dgm:presLayoutVars>
       </dgm:prSet>
       <dgm:spPr/>
+      <dgm:t>
+        <a:bodyPr/>
+        <a:lstStyle/>
+        <a:p>
+          <a:endParaRPr lang="bg-BG"/>
+        </a:p>
+      </dgm:t>
     </dgm:pt>
     <dgm:pt modelId="{40AAF5A4-B6F2-4C35-99D5-FA3FDDDB240E}" type="pres">
       <dgm:prSet presAssocID="{07D0D4BA-D025-4E1B-9C08-FEE17D4D5327}" presName="levelTx" presStyleLbl="revTx" presStyleIdx="0" presStyleCnt="0">
@@ -1126,6 +1135,13 @@
         </dgm:presLayoutVars>
       </dgm:prSet>
       <dgm:spPr/>
+      <dgm:t>
+        <a:bodyPr/>
+        <a:lstStyle/>
+        <a:p>
+          <a:endParaRPr lang="bg-BG"/>
+        </a:p>
+      </dgm:t>
     </dgm:pt>
     <dgm:pt modelId="{826130F0-11EB-49F7-8DF6-0705DC553D78}" type="pres">
       <dgm:prSet presAssocID="{C9B450C7-645D-4981-9000-C91DC27912F3}" presName="Name8" presStyleCnt="0"/>
@@ -1139,6 +1155,13 @@
         </dgm:presLayoutVars>
       </dgm:prSet>
       <dgm:spPr/>
+      <dgm:t>
+        <a:bodyPr/>
+        <a:lstStyle/>
+        <a:p>
+          <a:endParaRPr lang="bg-BG"/>
+        </a:p>
+      </dgm:t>
     </dgm:pt>
     <dgm:pt modelId="{D893F61A-7CD3-43D8-AA66-D7A7998BB54D}" type="pres">
       <dgm:prSet presAssocID="{C9B450C7-645D-4981-9000-C91DC27912F3}" presName="levelTx" presStyleLbl="revTx" presStyleIdx="0" presStyleCnt="0">
@@ -1148,6 +1171,13 @@
         </dgm:presLayoutVars>
       </dgm:prSet>
       <dgm:spPr/>
+      <dgm:t>
+        <a:bodyPr/>
+        <a:lstStyle/>
+        <a:p>
+          <a:endParaRPr lang="bg-BG"/>
+        </a:p>
+      </dgm:t>
     </dgm:pt>
     <dgm:pt modelId="{2A87F081-50F6-4E23-AEDF-14792C32904B}" type="pres">
       <dgm:prSet presAssocID="{F5C6CF61-C630-48F4-B82B-6FC7032F71B7}" presName="Name8" presStyleCnt="0"/>
@@ -1161,6 +1191,13 @@
         </dgm:presLayoutVars>
       </dgm:prSet>
       <dgm:spPr/>
+      <dgm:t>
+        <a:bodyPr/>
+        <a:lstStyle/>
+        <a:p>
+          <a:endParaRPr lang="bg-BG"/>
+        </a:p>
+      </dgm:t>
     </dgm:pt>
     <dgm:pt modelId="{FDB5F634-DD73-412D-9344-585D7EABB1AD}" type="pres">
       <dgm:prSet presAssocID="{F5C6CF61-C630-48F4-B82B-6FC7032F71B7}" presName="levelTx" presStyleLbl="revTx" presStyleIdx="0" presStyleCnt="0">
@@ -1170,6 +1207,13 @@
         </dgm:presLayoutVars>
       </dgm:prSet>
       <dgm:spPr/>
+      <dgm:t>
+        <a:bodyPr/>
+        <a:lstStyle/>
+        <a:p>
+          <a:endParaRPr lang="bg-BG"/>
+        </a:p>
+      </dgm:t>
     </dgm:pt>
     <dgm:pt modelId="{C3F286E1-D4AE-444C-B94A-F44940D469F0}" type="pres">
       <dgm:prSet presAssocID="{D2338D01-86D4-46E4-83A4-4F16550A0F6F}" presName="Name8" presStyleCnt="0"/>
@@ -1183,6 +1227,13 @@
         </dgm:presLayoutVars>
       </dgm:prSet>
       <dgm:spPr/>
+      <dgm:t>
+        <a:bodyPr/>
+        <a:lstStyle/>
+        <a:p>
+          <a:endParaRPr lang="bg-BG"/>
+        </a:p>
+      </dgm:t>
     </dgm:pt>
     <dgm:pt modelId="{27028588-A2E5-4854-8DCD-6D13C24B19A6}" type="pres">
       <dgm:prSet presAssocID="{D2338D01-86D4-46E4-83A4-4F16550A0F6F}" presName="levelTx" presStyleLbl="revTx" presStyleIdx="0" presStyleCnt="0">
@@ -1192,6 +1243,13 @@
         </dgm:presLayoutVars>
       </dgm:prSet>
       <dgm:spPr/>
+      <dgm:t>
+        <a:bodyPr/>
+        <a:lstStyle/>
+        <a:p>
+          <a:endParaRPr lang="bg-BG"/>
+        </a:p>
+      </dgm:t>
     </dgm:pt>
   </dgm:ptLst>
   <dgm:cxnLst>
@@ -1280,12 +1338,12 @@
         </a:fontRef>
       </dsp:style>
       <dsp:txBody>
-        <a:bodyPr spcFirstLastPara="0" vert="horz" wrap="square" lIns="58420" tIns="58420" rIns="58420" bIns="58420" numCol="1" spcCol="1270" anchor="ctr" anchorCtr="0">
+        <a:bodyPr spcFirstLastPara="0" vert="horz" wrap="square" lIns="54610" tIns="54610" rIns="54610" bIns="54610" numCol="1" spcCol="1270" anchor="ctr" anchorCtr="0">
           <a:noAutofit/>
         </a:bodyPr>
         <a:lstStyle/>
         <a:p>
-          <a:pPr marL="0" lvl="0" indent="0" algn="ctr" defTabSz="2044700">
+          <a:pPr lvl="0" algn="ctr" defTabSz="1911350">
             <a:lnSpc>
               <a:spcPct val="90000"/>
             </a:lnSpc>
@@ -1295,10 +1353,9 @@
             <a:spcAft>
               <a:spcPct val="35000"/>
             </a:spcAft>
-            <a:buNone/>
           </a:pPr>
           <a:r>
-            <a:rPr lang="en-US" sz="4600" kern="1200" dirty="0">
+            <a:rPr lang="en-US" sz="4300" kern="1200" dirty="0">
               <a:solidFill>
                 <a:schemeClr val="bg1"/>
               </a:solidFill>
@@ -1353,12 +1410,12 @@
         </a:fontRef>
       </dsp:style>
       <dsp:txBody>
-        <a:bodyPr spcFirstLastPara="0" vert="horz" wrap="square" lIns="58420" tIns="58420" rIns="58420" bIns="58420" numCol="1" spcCol="1270" anchor="ctr" anchorCtr="0">
+        <a:bodyPr spcFirstLastPara="0" vert="horz" wrap="square" lIns="54610" tIns="54610" rIns="54610" bIns="54610" numCol="1" spcCol="1270" anchor="ctr" anchorCtr="0">
           <a:noAutofit/>
         </a:bodyPr>
         <a:lstStyle/>
         <a:p>
-          <a:pPr marL="0" lvl="0" indent="0" algn="ctr" defTabSz="2044700">
+          <a:pPr lvl="0" algn="ctr" defTabSz="1911350">
             <a:lnSpc>
               <a:spcPct val="90000"/>
             </a:lnSpc>
@@ -1368,10 +1425,9 @@
             <a:spcAft>
               <a:spcPct val="35000"/>
             </a:spcAft>
-            <a:buNone/>
           </a:pPr>
           <a:r>
-            <a:rPr lang="en-US" sz="4600" kern="1200" dirty="0">
+            <a:rPr lang="en-US" sz="4300" kern="1200" dirty="0">
               <a:solidFill>
                 <a:schemeClr val="bg1"/>
               </a:solidFill>
@@ -1426,12 +1482,12 @@
         </a:fontRef>
       </dsp:style>
       <dsp:txBody>
-        <a:bodyPr spcFirstLastPara="0" vert="horz" wrap="square" lIns="58420" tIns="58420" rIns="58420" bIns="58420" numCol="1" spcCol="1270" anchor="ctr" anchorCtr="0">
+        <a:bodyPr spcFirstLastPara="0" vert="horz" wrap="square" lIns="54610" tIns="54610" rIns="54610" bIns="54610" numCol="1" spcCol="1270" anchor="ctr" anchorCtr="0">
           <a:noAutofit/>
         </a:bodyPr>
         <a:lstStyle/>
         <a:p>
-          <a:pPr marL="0" lvl="0" indent="0" algn="ctr" defTabSz="2044700">
+          <a:pPr lvl="0" algn="ctr" defTabSz="1911350">
             <a:lnSpc>
               <a:spcPct val="90000"/>
             </a:lnSpc>
@@ -1441,10 +1497,9 @@
             <a:spcAft>
               <a:spcPct val="35000"/>
             </a:spcAft>
-            <a:buNone/>
           </a:pPr>
           <a:r>
-            <a:rPr lang="en-US" sz="4600" kern="1200" dirty="0">
+            <a:rPr lang="en-US" sz="4300" kern="1200" dirty="0">
               <a:solidFill>
                 <a:schemeClr val="bg1"/>
               </a:solidFill>
@@ -1499,12 +1554,12 @@
         </a:fontRef>
       </dsp:style>
       <dsp:txBody>
-        <a:bodyPr spcFirstLastPara="0" vert="horz" wrap="square" lIns="58420" tIns="58420" rIns="58420" bIns="58420" numCol="1" spcCol="1270" anchor="ctr" anchorCtr="0">
+        <a:bodyPr spcFirstLastPara="0" vert="horz" wrap="square" lIns="54610" tIns="54610" rIns="54610" bIns="54610" numCol="1" spcCol="1270" anchor="ctr" anchorCtr="0">
           <a:noAutofit/>
         </a:bodyPr>
         <a:lstStyle/>
         <a:p>
-          <a:pPr marL="0" lvl="0" indent="0" algn="ctr" defTabSz="2044700">
+          <a:pPr lvl="0" algn="ctr" defTabSz="1911350">
             <a:lnSpc>
               <a:spcPct val="90000"/>
             </a:lnSpc>
@@ -1514,10 +1569,9 @@
             <a:spcAft>
               <a:spcPct val="35000"/>
             </a:spcAft>
-            <a:buNone/>
           </a:pPr>
           <a:r>
-            <a:rPr lang="en-US" sz="4600" kern="1200" dirty="0">
+            <a:rPr lang="en-US" sz="4300" kern="1200" dirty="0">
               <a:solidFill>
                 <a:schemeClr val="bg1"/>
               </a:solidFill>
@@ -2883,7 +2937,7 @@
           <a:p>
             <a:fld id="{40C9EC12-D619-4239-BA0B-F64B757C48A8}" type="datetimeFigureOut">
               <a:rPr lang="bg-BG" smtClean="0"/>
-              <a:t>5.3.2017 г.</a:t>
+              <a:t>10.3.2017 г.</a:t>
             </a:fld>
             <a:endParaRPr lang="bg-BG"/>
           </a:p>
@@ -3505,7 +3559,7 @@
             <a:fld id="{87DE6118-2437-4B30-8E3C-4D2BE6020583}" type="datetimeFigureOut">
               <a:rPr lang="en-US" smtClean="0"/>
               <a:pPr/>
-              <a:t>3/5/2017</a:t>
+              <a:t>3/10/2017</a:t>
             </a:fld>
             <a:endParaRPr lang="en-US" dirty="0"/>
           </a:p>
@@ -3836,7 +3890,7 @@
           <a:p>
             <a:fld id="{87DE6118-2437-4B30-8E3C-4D2BE6020583}" type="datetimeFigureOut">
               <a:rPr lang="en-US" smtClean="0"/>
-              <a:t>3/5/2017</a:t>
+              <a:t>3/10/2017</a:t>
             </a:fld>
             <a:endParaRPr lang="en-US" dirty="0"/>
           </a:p>
@@ -4016,7 +4070,7 @@
           <a:p>
             <a:fld id="{87DE6118-2437-4B30-8E3C-4D2BE6020583}" type="datetimeFigureOut">
               <a:rPr lang="en-US" smtClean="0"/>
-              <a:t>3/5/2017</a:t>
+              <a:t>3/10/2017</a:t>
             </a:fld>
             <a:endParaRPr lang="en-US" dirty="0"/>
           </a:p>
@@ -4186,7 +4240,7 @@
           <a:p>
             <a:fld id="{87DE6118-2437-4B30-8E3C-4D2BE6020583}" type="datetimeFigureOut">
               <a:rPr lang="en-US" smtClean="0"/>
-              <a:t>3/5/2017</a:t>
+              <a:t>3/10/2017</a:t>
             </a:fld>
             <a:endParaRPr lang="en-US" dirty="0"/>
           </a:p>
@@ -4470,7 +4524,7 @@
             <a:fld id="{87DE6118-2437-4B30-8E3C-4D2BE6020583}" type="datetimeFigureOut">
               <a:rPr lang="en-US" smtClean="0"/>
               <a:pPr/>
-              <a:t>3/5/2017</a:t>
+              <a:t>3/10/2017</a:t>
             </a:fld>
             <a:endParaRPr lang="en-US" dirty="0"/>
           </a:p>
@@ -4865,7 +4919,7 @@
           <a:p>
             <a:fld id="{87DE6118-2437-4B30-8E3C-4D2BE6020583}" type="datetimeFigureOut">
               <a:rPr lang="en-US" smtClean="0"/>
-              <a:t>3/5/2017</a:t>
+              <a:t>3/10/2017</a:t>
             </a:fld>
             <a:endParaRPr lang="en-US" dirty="0"/>
           </a:p>
@@ -5342,7 +5396,7 @@
           <a:p>
             <a:fld id="{87DE6118-2437-4B30-8E3C-4D2BE6020583}" type="datetimeFigureOut">
               <a:rPr lang="en-US" smtClean="0"/>
-              <a:t>3/5/2017</a:t>
+              <a:t>3/10/2017</a:t>
             </a:fld>
             <a:endParaRPr lang="en-US" dirty="0"/>
           </a:p>
@@ -5460,7 +5514,7 @@
           <a:p>
             <a:fld id="{87DE6118-2437-4B30-8E3C-4D2BE6020583}" type="datetimeFigureOut">
               <a:rPr lang="en-US" smtClean="0"/>
-              <a:t>3/5/2017</a:t>
+              <a:t>3/10/2017</a:t>
             </a:fld>
             <a:endParaRPr lang="en-US" dirty="0"/>
           </a:p>
@@ -5555,7 +5609,7 @@
           <a:p>
             <a:fld id="{87DE6118-2437-4B30-8E3C-4D2BE6020583}" type="datetimeFigureOut">
               <a:rPr lang="en-US" smtClean="0"/>
-              <a:t>3/5/2017</a:t>
+              <a:t>3/10/2017</a:t>
             </a:fld>
             <a:endParaRPr lang="en-US" dirty="0"/>
           </a:p>
@@ -5902,7 +5956,7 @@
             <a:fld id="{87DE6118-2437-4B30-8E3C-4D2BE6020583}" type="datetimeFigureOut">
               <a:rPr lang="en-US" smtClean="0"/>
               <a:pPr/>
-              <a:t>3/5/2017</a:t>
+              <a:t>3/10/2017</a:t>
             </a:fld>
             <a:endParaRPr lang="en-US" dirty="0"/>
           </a:p>
@@ -6292,7 +6346,7 @@
             <a:fld id="{87DE6118-2437-4B30-8E3C-4D2BE6020583}" type="datetimeFigureOut">
               <a:rPr lang="en-US" smtClean="0"/>
               <a:pPr/>
-              <a:t>3/5/2017</a:t>
+              <a:t>3/10/2017</a:t>
             </a:fld>
             <a:endParaRPr lang="en-US" dirty="0"/>
           </a:p>
@@ -6572,7 +6626,7 @@
             <a:fld id="{87DE6118-2437-4B30-8E3C-4D2BE6020583}" type="datetimeFigureOut">
               <a:rPr lang="en-US" smtClean="0"/>
               <a:pPr/>
-              <a:t>3/5/2017</a:t>
+              <a:t>3/10/2017</a:t>
             </a:fld>
             <a:endParaRPr lang="en-US" dirty="0"/>
           </a:p>
@@ -7133,13 +7187,13 @@
         <p:spPr/>
         <p:txBody>
           <a:bodyPr>
-            <a:normAutofit fontScale="92500" lnSpcReduction="10000"/>
+            <a:noAutofit/>
           </a:bodyPr>
           <a:lstStyle/>
           <a:p>
             <a:pPr algn="l"/>
             <a:r>
-              <a:rPr lang="en-US" dirty="0">
+              <a:rPr lang="en-US" sz="2100" dirty="0">
                 <a:solidFill>
                   <a:schemeClr val="bg1">
                     <a:lumMod val="50000"/>
@@ -7152,7 +7206,7 @@
           <a:p>
             <a:pPr algn="l"/>
             <a:r>
-              <a:rPr lang="en-US" dirty="0">
+              <a:rPr lang="en-US" sz="2100" dirty="0">
                 <a:solidFill>
                   <a:schemeClr val="bg1">
                     <a:lumMod val="50000"/>
@@ -7165,7 +7219,7 @@
           <a:p>
             <a:pPr algn="l"/>
             <a:r>
-              <a:rPr lang="en-US" dirty="0">
+              <a:rPr lang="en-US" sz="2100" dirty="0">
                 <a:solidFill>
                   <a:schemeClr val="bg1">
                     <a:lumMod val="50000"/>
@@ -7175,7 +7229,7 @@
               <a:t>@</a:t>
             </a:r>
             <a:r>
-              <a:rPr lang="en-US" dirty="0" err="1">
+              <a:rPr lang="en-US" sz="2100" dirty="0" smtClean="0">
                 <a:solidFill>
                   <a:schemeClr val="bg1">
                     <a:lumMod val="50000"/>
@@ -7184,7 +7238,20 @@
               </a:rPr>
               <a:t>pkyurkchiev</a:t>
             </a:r>
-            <a:endParaRPr lang="bg-BG" dirty="0">
+          </a:p>
+          <a:p>
+            <a:pPr algn="l"/>
+            <a:r>
+              <a:rPr lang="en-US" sz="2100" dirty="0">
+                <a:solidFill>
+                  <a:schemeClr val="bg1">
+                    <a:lumMod val="50000"/>
+                  </a:schemeClr>
+                </a:solidFill>
+              </a:rPr>
+              <a:t>https://github.com/pkyurkchiev</a:t>
+            </a:r>
+            <a:endParaRPr lang="bg-BG" sz="2100" dirty="0">
               <a:solidFill>
                 <a:schemeClr val="bg1">
                   <a:lumMod val="50000"/>
@@ -21534,6 +21601,82 @@
 <file path=ppt/slides/slide24.xml><?xml version="1.0" encoding="utf-8"?>
 <p:sld xmlns:a="http://schemas.openxmlformats.org/drawingml/2006/main" xmlns:r="http://schemas.openxmlformats.org/officeDocument/2006/relationships" xmlns:p="http://schemas.openxmlformats.org/presentationml/2006/main">
   <p:cSld>
+    <p:spTree>
+      <p:nvGrpSpPr>
+        <p:cNvPr id="1" name=""/>
+        <p:cNvGrpSpPr/>
+        <p:nvPr/>
+      </p:nvGrpSpPr>
+      <p:grpSpPr>
+        <a:xfrm>
+          <a:off x="0" y="0"/>
+          <a:ext cx="0" cy="0"/>
+          <a:chOff x="0" y="0"/>
+          <a:chExt cx="0" cy="0"/>
+        </a:xfrm>
+      </p:grpSpPr>
+      <p:sp>
+        <p:nvSpPr>
+          <p:cNvPr id="4" name="Title 3"/>
+          <p:cNvSpPr>
+            <a:spLocks noGrp="1"/>
+          </p:cNvSpPr>
+          <p:nvPr>
+            <p:ph type="title"/>
+          </p:nvPr>
+        </p:nvSpPr>
+        <p:spPr/>
+        <p:txBody>
+          <a:bodyPr/>
+          <a:lstStyle/>
+          <a:p>
+            <a:r>
+              <a:rPr lang="en-US" dirty="0"/>
+              <a:t>Demo </a:t>
+            </a:r>
+            <a:r>
+              <a:rPr lang="en-US" dirty="0" smtClean="0"/>
+              <a:t>data Binding</a:t>
+            </a:r>
+            <a:endParaRPr lang="bg-BG" dirty="0"/>
+          </a:p>
+        </p:txBody>
+      </p:sp>
+      <p:sp>
+        <p:nvSpPr>
+          <p:cNvPr id="5" name="Text Placeholder 4"/>
+          <p:cNvSpPr>
+            <a:spLocks noGrp="1"/>
+          </p:cNvSpPr>
+          <p:nvPr>
+            <p:ph type="body" idx="1"/>
+          </p:nvPr>
+        </p:nvSpPr>
+        <p:spPr/>
+        <p:txBody>
+          <a:bodyPr/>
+          <a:lstStyle/>
+          <a:p>
+            <a:endParaRPr lang="bg-BG"/>
+          </a:p>
+        </p:txBody>
+      </p:sp>
+    </p:spTree>
+    <p:extLst>
+      <p:ext uri="{BB962C8B-B14F-4D97-AF65-F5344CB8AC3E}">
+        <p14:creationId xmlns:p14="http://schemas.microsoft.com/office/powerpoint/2010/main" val="3247365149"/>
+      </p:ext>
+    </p:extLst>
+  </p:cSld>
+  <p:clrMapOvr>
+    <a:masterClrMapping/>
+  </p:clrMapOvr>
+</p:sld>
+</file>
+
+<file path=ppt/slides/slide25.xml><?xml version="1.0" encoding="utf-8"?>
+<p:sld xmlns:a="http://schemas.openxmlformats.org/drawingml/2006/main" xmlns:r="http://schemas.openxmlformats.org/officeDocument/2006/relationships" xmlns:p="http://schemas.openxmlformats.org/presentationml/2006/main">
+  <p:cSld>
     <p:bg>
       <p:bgPr>
         <a:solidFill>
@@ -21654,7 +21797,7 @@
 </p:sld>
 </file>
 
-<file path=ppt/slides/slide25.xml><?xml version="1.0" encoding="utf-8"?>
+<file path=ppt/slides/slide26.xml><?xml version="1.0" encoding="utf-8"?>
 <p:sld xmlns:a="http://schemas.openxmlformats.org/drawingml/2006/main" xmlns:r="http://schemas.openxmlformats.org/officeDocument/2006/relationships" xmlns:p="http://schemas.openxmlformats.org/presentationml/2006/main">
   <p:cSld>
     <p:spTree>
@@ -22588,7 +22731,7 @@
 </p:sld>
 </file>
 
-<file path=ppt/slides/slide26.xml><?xml version="1.0" encoding="utf-8"?>
+<file path=ppt/slides/slide27.xml><?xml version="1.0" encoding="utf-8"?>
 <p:sld xmlns:a="http://schemas.openxmlformats.org/drawingml/2006/main" xmlns:r="http://schemas.openxmlformats.org/officeDocument/2006/relationships" xmlns:p="http://schemas.openxmlformats.org/presentationml/2006/main">
   <p:cSld>
     <p:spTree>
@@ -22956,7 +23099,7 @@
 </p:sld>
 </file>
 
-<file path=ppt/slides/slide27.xml><?xml version="1.0" encoding="utf-8"?>
+<file path=ppt/slides/slide28.xml><?xml version="1.0" encoding="utf-8"?>
 <p:sld xmlns:a="http://schemas.openxmlformats.org/drawingml/2006/main" xmlns:r="http://schemas.openxmlformats.org/officeDocument/2006/relationships" xmlns:p="http://schemas.openxmlformats.org/presentationml/2006/main">
   <p:cSld>
     <p:bg>
@@ -23031,7 +23174,7 @@
 </p:sld>
 </file>
 
-<file path=ppt/slides/slide28.xml><?xml version="1.0" encoding="utf-8"?>
+<file path=ppt/slides/slide29.xml><?xml version="1.0" encoding="utf-8"?>
 <p:sld xmlns:a="http://schemas.openxmlformats.org/drawingml/2006/main" xmlns:r="http://schemas.openxmlformats.org/officeDocument/2006/relationships" xmlns:p="http://schemas.openxmlformats.org/presentationml/2006/main">
   <p:cSld>
     <p:spTree>
@@ -23512,79 +23655,6 @@
 </p:sld>
 </file>
 
-<file path=ppt/slides/slide29.xml><?xml version="1.0" encoding="utf-8"?>
-<p:sld xmlns:a="http://schemas.openxmlformats.org/drawingml/2006/main" xmlns:r="http://schemas.openxmlformats.org/officeDocument/2006/relationships" xmlns:p="http://schemas.openxmlformats.org/presentationml/2006/main">
-  <p:cSld>
-    <p:spTree>
-      <p:nvGrpSpPr>
-        <p:cNvPr id="1" name=""/>
-        <p:cNvGrpSpPr/>
-        <p:nvPr/>
-      </p:nvGrpSpPr>
-      <p:grpSpPr>
-        <a:xfrm>
-          <a:off x="0" y="0"/>
-          <a:ext cx="0" cy="0"/>
-          <a:chOff x="0" y="0"/>
-          <a:chExt cx="0" cy="0"/>
-        </a:xfrm>
-      </p:grpSpPr>
-      <p:sp>
-        <p:nvSpPr>
-          <p:cNvPr id="2" name="Title 1"/>
-          <p:cNvSpPr>
-            <a:spLocks noGrp="1"/>
-          </p:cNvSpPr>
-          <p:nvPr>
-            <p:ph type="title"/>
-          </p:nvPr>
-        </p:nvSpPr>
-        <p:spPr/>
-        <p:txBody>
-          <a:bodyPr/>
-          <a:lstStyle/>
-          <a:p>
-            <a:endParaRPr lang="bg-BG"/>
-          </a:p>
-        </p:txBody>
-      </p:sp>
-      <p:pic>
-        <p:nvPicPr>
-          <p:cNvPr id="3" name="Content Placeholder 5"/>
-          <p:cNvPicPr>
-            <a:picLocks noChangeAspect="1"/>
-          </p:cNvPicPr>
-          <p:nvPr/>
-        </p:nvPicPr>
-        <p:blipFill>
-          <a:blip r:embed="rId2"/>
-          <a:stretch>
-            <a:fillRect/>
-          </a:stretch>
-        </p:blipFill>
-        <p:spPr>
-          <a:xfrm>
-            <a:off x="11078383" y="91119"/>
-            <a:ext cx="886383" cy="1497651"/>
-          </a:xfrm>
-          <a:prstGeom prst="rect">
-            <a:avLst/>
-          </a:prstGeom>
-        </p:spPr>
-      </p:pic>
-    </p:spTree>
-    <p:extLst>
-      <p:ext uri="{BB962C8B-B14F-4D97-AF65-F5344CB8AC3E}">
-        <p14:creationId xmlns:p14="http://schemas.microsoft.com/office/powerpoint/2010/main" val="681104045"/>
-      </p:ext>
-    </p:extLst>
-  </p:cSld>
-  <p:clrMapOvr>
-    <a:masterClrMapping/>
-  </p:clrMapOvr>
-</p:sld>
-</file>
-
 <file path=ppt/slides/slide3.xml><?xml version="1.0" encoding="utf-8"?>
 <p:sld xmlns:a="http://schemas.openxmlformats.org/drawingml/2006/main" xmlns:r="http://schemas.openxmlformats.org/officeDocument/2006/relationships" xmlns:p="http://schemas.openxmlformats.org/presentationml/2006/main">
   <p:cSld>
@@ -23695,6 +23765,155 @@
 </file>
 
 <file path=ppt/slides/slide30.xml><?xml version="1.0" encoding="utf-8"?>
+<p:sld xmlns:a="http://schemas.openxmlformats.org/drawingml/2006/main" xmlns:r="http://schemas.openxmlformats.org/officeDocument/2006/relationships" xmlns:p="http://schemas.openxmlformats.org/presentationml/2006/main">
+  <p:cSld>
+    <p:spTree>
+      <p:nvGrpSpPr>
+        <p:cNvPr id="1" name=""/>
+        <p:cNvGrpSpPr/>
+        <p:nvPr/>
+      </p:nvGrpSpPr>
+      <p:grpSpPr>
+        <a:xfrm>
+          <a:off x="0" y="0"/>
+          <a:ext cx="0" cy="0"/>
+          <a:chOff x="0" y="0"/>
+          <a:chExt cx="0" cy="0"/>
+        </a:xfrm>
+      </p:grpSpPr>
+      <p:sp>
+        <p:nvSpPr>
+          <p:cNvPr id="2" name="Title 1"/>
+          <p:cNvSpPr>
+            <a:spLocks noGrp="1"/>
+          </p:cNvSpPr>
+          <p:nvPr>
+            <p:ph type="title"/>
+          </p:nvPr>
+        </p:nvSpPr>
+        <p:spPr/>
+        <p:txBody>
+          <a:bodyPr/>
+          <a:lstStyle/>
+          <a:p>
+            <a:endParaRPr lang="bg-BG"/>
+          </a:p>
+        </p:txBody>
+      </p:sp>
+      <p:pic>
+        <p:nvPicPr>
+          <p:cNvPr id="3" name="Content Placeholder 5"/>
+          <p:cNvPicPr>
+            <a:picLocks noChangeAspect="1"/>
+          </p:cNvPicPr>
+          <p:nvPr/>
+        </p:nvPicPr>
+        <p:blipFill>
+          <a:blip r:embed="rId2"/>
+          <a:stretch>
+            <a:fillRect/>
+          </a:stretch>
+        </p:blipFill>
+        <p:spPr>
+          <a:xfrm>
+            <a:off x="11078383" y="91119"/>
+            <a:ext cx="886383" cy="1497651"/>
+          </a:xfrm>
+          <a:prstGeom prst="rect">
+            <a:avLst/>
+          </a:prstGeom>
+        </p:spPr>
+      </p:pic>
+    </p:spTree>
+    <p:extLst>
+      <p:ext uri="{BB962C8B-B14F-4D97-AF65-F5344CB8AC3E}">
+        <p14:creationId xmlns:p14="http://schemas.microsoft.com/office/powerpoint/2010/main" val="681104045"/>
+      </p:ext>
+    </p:extLst>
+  </p:cSld>
+  <p:clrMapOvr>
+    <a:masterClrMapping/>
+  </p:clrMapOvr>
+</p:sld>
+</file>
+
+<file path=ppt/slides/slide31.xml><?xml version="1.0" encoding="utf-8"?>
+<p:sld xmlns:a="http://schemas.openxmlformats.org/drawingml/2006/main" xmlns:r="http://schemas.openxmlformats.org/officeDocument/2006/relationships" xmlns:p="http://schemas.openxmlformats.org/presentationml/2006/main">
+  <p:cSld>
+    <p:spTree>
+      <p:nvGrpSpPr>
+        <p:cNvPr id="1" name=""/>
+        <p:cNvGrpSpPr/>
+        <p:nvPr/>
+      </p:nvGrpSpPr>
+      <p:grpSpPr>
+        <a:xfrm>
+          <a:off x="0" y="0"/>
+          <a:ext cx="0" cy="0"/>
+          <a:chOff x="0" y="0"/>
+          <a:chExt cx="0" cy="0"/>
+        </a:xfrm>
+      </p:grpSpPr>
+      <p:sp>
+        <p:nvSpPr>
+          <p:cNvPr id="4" name="Title 3"/>
+          <p:cNvSpPr>
+            <a:spLocks noGrp="1"/>
+          </p:cNvSpPr>
+          <p:nvPr>
+            <p:ph type="title"/>
+          </p:nvPr>
+        </p:nvSpPr>
+        <p:spPr/>
+        <p:txBody>
+          <a:bodyPr/>
+          <a:lstStyle/>
+          <a:p>
+            <a:r>
+              <a:rPr lang="en-US"/>
+              <a:t>Demo </a:t>
+            </a:r>
+            <a:r>
+              <a:rPr lang="en-US" smtClean="0"/>
+              <a:t>Modules</a:t>
+            </a:r>
+            <a:endParaRPr lang="bg-BG" dirty="0"/>
+          </a:p>
+        </p:txBody>
+      </p:sp>
+      <p:sp>
+        <p:nvSpPr>
+          <p:cNvPr id="5" name="Text Placeholder 4"/>
+          <p:cNvSpPr>
+            <a:spLocks noGrp="1"/>
+          </p:cNvSpPr>
+          <p:nvPr>
+            <p:ph type="body" idx="1"/>
+          </p:nvPr>
+        </p:nvSpPr>
+        <p:spPr/>
+        <p:txBody>
+          <a:bodyPr/>
+          <a:lstStyle/>
+          <a:p>
+            <a:endParaRPr lang="bg-BG"/>
+          </a:p>
+        </p:txBody>
+      </p:sp>
+    </p:spTree>
+    <p:extLst>
+      <p:ext uri="{BB962C8B-B14F-4D97-AF65-F5344CB8AC3E}">
+        <p14:creationId xmlns:p14="http://schemas.microsoft.com/office/powerpoint/2010/main" val="318115565"/>
+      </p:ext>
+    </p:extLst>
+  </p:cSld>
+  <p:clrMapOvr>
+    <a:masterClrMapping/>
+  </p:clrMapOvr>
+</p:sld>
+</file>
+
+<file path=ppt/slides/slide32.xml><?xml version="1.0" encoding="utf-8"?>
 <p:sld xmlns:a="http://schemas.openxmlformats.org/drawingml/2006/main" xmlns:r="http://schemas.openxmlformats.org/officeDocument/2006/relationships" xmlns:p="http://schemas.openxmlformats.org/presentationml/2006/main">
   <p:cSld>
     <p:spTree>
@@ -25183,7 +25402,7 @@
 </p:sld>
 </file>
 
-<file path=ppt/slides/slide31.xml><?xml version="1.0" encoding="utf-8"?>
+<file path=ppt/slides/slide33.xml><?xml version="1.0" encoding="utf-8"?>
 <p:sld xmlns:a="http://schemas.openxmlformats.org/drawingml/2006/main" xmlns:r="http://schemas.openxmlformats.org/officeDocument/2006/relationships" xmlns:p="http://schemas.openxmlformats.org/presentationml/2006/main">
   <p:cSld>
     <p:spTree>
@@ -25217,7 +25436,9 @@
           </a:xfrm>
         </p:spPr>
         <p:txBody>
-          <a:bodyPr/>
+          <a:bodyPr>
+            <a:normAutofit fontScale="90000"/>
+          </a:bodyPr>
           <a:lstStyle/>
           <a:p>
             <a:pPr algn="ctr"/>
@@ -27064,7 +27285,7 @@
         </p:spPr>
         <p:txBody>
           <a:bodyPr>
-            <a:normAutofit/>
+            <a:normAutofit fontScale="90000"/>
           </a:bodyPr>
           <a:lstStyle/>
           <a:p>
@@ -27075,6 +27296,14 @@
                 </a:solidFill>
               </a:rPr>
               <a:t>TypeScript</a:t>
+            </a:r>
+            <a:r>
+              <a:rPr lang="en-US" dirty="0">
+                <a:solidFill>
+                  <a:schemeClr val="bg1"/>
+                </a:solidFill>
+              </a:rPr>
+              <a:t/>
             </a:r>
             <a:br>
               <a:rPr lang="en-US" dirty="0">
@@ -27162,6 +27391,14 @@
                 </a:solidFill>
               </a:rPr>
               <a:t>ES6</a:t>
+            </a:r>
+            <a:r>
+              <a:rPr lang="en-US" dirty="0">
+                <a:solidFill>
+                  <a:schemeClr val="bg1"/>
+                </a:solidFill>
+              </a:rPr>
+              <a:t/>
             </a:r>
             <a:br>
               <a:rPr lang="en-US" dirty="0">

</xml_diff>